<commit_message>
add one step in pptx
</commit_message>
<xml_diff>
--- a/Demo/JSON Web Tokens.pptx
+++ b/Demo/JSON Web Tokens.pptx
@@ -361,7 +361,7 @@
           <a:p>
             <a:fld id="{8C13F034-32E7-47A4-9773-CDA578B110AC}" type="slidenum">
               <a:rPr lang="en-US" smtClean="0"/>
-              <a:t>‹Nº›</a:t>
+              <a:t>‹#›</a:t>
             </a:fld>
             <a:endParaRPr lang="en-US"/>
           </a:p>
@@ -1953,7 +1953,7 @@
           <a:p>
             <a:fld id="{F2EB563B-D9AF-4A47-85F5-5E53DDA58F4A}" type="slidenum">
               <a:rPr lang="en-US" smtClean="0"/>
-              <a:t>‹Nº›</a:t>
+              <a:t>‹#›</a:t>
             </a:fld>
             <a:endParaRPr lang="en-US"/>
           </a:p>
@@ -2153,7 +2153,7 @@
           <a:p>
             <a:fld id="{F2EB563B-D9AF-4A47-85F5-5E53DDA58F4A}" type="slidenum">
               <a:rPr lang="en-US" smtClean="0"/>
-              <a:t>‹Nº›</a:t>
+              <a:t>‹#›</a:t>
             </a:fld>
             <a:endParaRPr lang="en-US"/>
           </a:p>
@@ -2363,7 +2363,7 @@
           <a:p>
             <a:fld id="{F2EB563B-D9AF-4A47-85F5-5E53DDA58F4A}" type="slidenum">
               <a:rPr lang="en-US" smtClean="0"/>
-              <a:t>‹Nº›</a:t>
+              <a:t>‹#›</a:t>
             </a:fld>
             <a:endParaRPr lang="en-US"/>
           </a:p>
@@ -2563,7 +2563,7 @@
           <a:p>
             <a:fld id="{F2EB563B-D9AF-4A47-85F5-5E53DDA58F4A}" type="slidenum">
               <a:rPr lang="en-US" smtClean="0"/>
-              <a:t>‹Nº›</a:t>
+              <a:t>‹#›</a:t>
             </a:fld>
             <a:endParaRPr lang="en-US"/>
           </a:p>
@@ -2839,7 +2839,7 @@
           <a:p>
             <a:fld id="{F2EB563B-D9AF-4A47-85F5-5E53DDA58F4A}" type="slidenum">
               <a:rPr lang="en-US" smtClean="0"/>
-              <a:t>‹Nº›</a:t>
+              <a:t>‹#›</a:t>
             </a:fld>
             <a:endParaRPr lang="en-US"/>
           </a:p>
@@ -3107,7 +3107,7 @@
           <a:p>
             <a:fld id="{F2EB563B-D9AF-4A47-85F5-5E53DDA58F4A}" type="slidenum">
               <a:rPr lang="en-US" smtClean="0"/>
-              <a:t>‹Nº›</a:t>
+              <a:t>‹#›</a:t>
             </a:fld>
             <a:endParaRPr lang="en-US"/>
           </a:p>
@@ -3522,7 +3522,7 @@
           <a:p>
             <a:fld id="{F2EB563B-D9AF-4A47-85F5-5E53DDA58F4A}" type="slidenum">
               <a:rPr lang="en-US" smtClean="0"/>
-              <a:t>‹Nº›</a:t>
+              <a:t>‹#›</a:t>
             </a:fld>
             <a:endParaRPr lang="en-US"/>
           </a:p>
@@ -3664,7 +3664,7 @@
           <a:p>
             <a:fld id="{F2EB563B-D9AF-4A47-85F5-5E53DDA58F4A}" type="slidenum">
               <a:rPr lang="en-US" smtClean="0"/>
-              <a:t>‹Nº›</a:t>
+              <a:t>‹#›</a:t>
             </a:fld>
             <a:endParaRPr lang="en-US"/>
           </a:p>
@@ -3777,7 +3777,7 @@
           <a:p>
             <a:fld id="{F2EB563B-D9AF-4A47-85F5-5E53DDA58F4A}" type="slidenum">
               <a:rPr lang="en-US" smtClean="0"/>
-              <a:t>‹Nº›</a:t>
+              <a:t>‹#›</a:t>
             </a:fld>
             <a:endParaRPr lang="en-US"/>
           </a:p>
@@ -4090,7 +4090,7 @@
           <a:p>
             <a:fld id="{F2EB563B-D9AF-4A47-85F5-5E53DDA58F4A}" type="slidenum">
               <a:rPr lang="en-US" smtClean="0"/>
-              <a:t>‹Nº›</a:t>
+              <a:t>‹#›</a:t>
             </a:fld>
             <a:endParaRPr lang="en-US"/>
           </a:p>
@@ -4379,7 +4379,7 @@
           <a:p>
             <a:fld id="{F2EB563B-D9AF-4A47-85F5-5E53DDA58F4A}" type="slidenum">
               <a:rPr lang="en-US" smtClean="0"/>
-              <a:t>‹Nº›</a:t>
+              <a:t>‹#›</a:t>
             </a:fld>
             <a:endParaRPr lang="en-US"/>
           </a:p>
@@ -4658,7 +4658,7 @@
           <a:p>
             <a:fld id="{F2EB563B-D9AF-4A47-85F5-5E53DDA58F4A}" type="slidenum">
               <a:rPr lang="en-US" smtClean="0"/>
-              <a:t>‹Nº›</a:t>
+              <a:t>‹#›</a:t>
             </a:fld>
             <a:endParaRPr lang="en-US"/>
           </a:p>
@@ -5230,7 +5230,7 @@
             </a:r>
             <a:r>
               <a:rPr lang="en-US" i="1" dirty="0"/>
-              <a:t>Because JSON Web Tokens can be signed, you can be sure that senders are who they say they are. And also you can verify that the content hasn’t been modify.</a:t>
+              <a:t>Because JSON Web Tokens can be signed, you can be sure that senders are who they say they are. Also, you can verify that the content hasn’t been modify.</a:t>
             </a:r>
           </a:p>
         </p:txBody>
@@ -5421,7 +5421,7 @@
           <a:p>
             <a:r>
               <a:rPr lang="en-US" b="1" dirty="0"/>
-              <a:t>Flow</a:t>
+              <a:t>Demo Flow</a:t>
             </a:r>
           </a:p>
         </p:txBody>
@@ -5777,18 +5777,19 @@
             </a:extLst>
           </p:cNvPr>
           <p:cNvCxnSpPr>
-            <a:stCxn id="4" idx="2"/>
-            <a:endCxn id="7" idx="1"/>
+            <a:cxnSpLocks/>
           </p:cNvCxnSpPr>
           <p:nvPr/>
         </p:nvCxnSpPr>
         <p:spPr>
-          <a:xfrm rot="16200000" flipH="1">
-            <a:off x="4706177" y="1451112"/>
-            <a:ext cx="1598544" cy="5017603"/>
+          <a:xfrm>
+            <a:off x="2921377" y="3160644"/>
+            <a:ext cx="5092876" cy="1594503"/>
           </a:xfrm>
-          <a:prstGeom prst="bentConnector2">
-            <a:avLst/>
+          <a:prstGeom prst="bentConnector3">
+            <a:avLst>
+              <a:gd name="adj1" fmla="val -566"/>
+            </a:avLst>
           </a:prstGeom>
           <a:ln>
             <a:tailEnd type="triangle"/>
@@ -5823,7 +5824,7 @@
         </p:nvSpPr>
         <p:spPr>
           <a:xfrm>
-            <a:off x="3893239" y="4528355"/>
+            <a:off x="4836678" y="4500103"/>
             <a:ext cx="3055454" cy="230832"/>
           </a:xfrm>
           <a:prstGeom prst="rect">
@@ -5840,6 +5841,84 @@
             <a:r>
               <a:rPr lang="en-US" sz="900" dirty="0"/>
               <a:t>3. JWT is sent with every request to access protected data</a:t>
+            </a:r>
+          </a:p>
+        </p:txBody>
+      </p:sp>
+      <p:cxnSp>
+        <p:nvCxnSpPr>
+          <p:cNvPr id="8" name="Connector: Elbow 7">
+            <a:extLst>
+              <a:ext uri="{FF2B5EF4-FFF2-40B4-BE49-F238E27FC236}">
+                <a16:creationId xmlns:a16="http://schemas.microsoft.com/office/drawing/2014/main" id="{69B3EAD8-5469-4F27-B43B-C1F938387FE0}"/>
+              </a:ext>
+            </a:extLst>
+          </p:cNvPr>
+          <p:cNvCxnSpPr>
+            <a:cxnSpLocks/>
+          </p:cNvCxnSpPr>
+          <p:nvPr/>
+        </p:nvCxnSpPr>
+        <p:spPr>
+          <a:xfrm rot="10800000">
+            <a:off x="2677140" y="3153678"/>
+            <a:ext cx="5459154" cy="1791546"/>
+          </a:xfrm>
+          <a:prstGeom prst="bentConnector3">
+            <a:avLst>
+              <a:gd name="adj1" fmla="val 100078"/>
+            </a:avLst>
+          </a:prstGeom>
+          <a:ln>
+            <a:tailEnd type="triangle"/>
+          </a:ln>
+        </p:spPr>
+        <p:style>
+          <a:lnRef idx="1">
+            <a:schemeClr val="accent2"/>
+          </a:lnRef>
+          <a:fillRef idx="0">
+            <a:schemeClr val="accent2"/>
+          </a:fillRef>
+          <a:effectRef idx="0">
+            <a:schemeClr val="accent2"/>
+          </a:effectRef>
+          <a:fontRef idx="minor">
+            <a:schemeClr val="tx1"/>
+          </a:fontRef>
+        </p:style>
+      </p:cxnSp>
+      <p:sp>
+        <p:nvSpPr>
+          <p:cNvPr id="21" name="CuadroTexto 19">
+            <a:extLst>
+              <a:ext uri="{FF2B5EF4-FFF2-40B4-BE49-F238E27FC236}">
+                <a16:creationId xmlns:a16="http://schemas.microsoft.com/office/drawing/2014/main" id="{C9503EC9-F582-4E61-9B2C-E613A27FF805}"/>
+              </a:ext>
+            </a:extLst>
+          </p:cNvPr>
+          <p:cNvSpPr txBox="1"/>
+          <p:nvPr/>
+        </p:nvSpPr>
+        <p:spPr>
+          <a:xfrm>
+            <a:off x="2962991" y="4975041"/>
+            <a:ext cx="3335172" cy="230832"/>
+          </a:xfrm>
+          <a:prstGeom prst="rect">
+            <a:avLst/>
+          </a:prstGeom>
+          <a:noFill/>
+        </p:spPr>
+        <p:txBody>
+          <a:bodyPr wrap="square" rtlCol="0">
+            <a:spAutoFit/>
+          </a:bodyPr>
+          <a:lstStyle/>
+          <a:p>
+            <a:r>
+              <a:rPr lang="en-US" sz="900" dirty="0"/>
+              <a:t>4. If JWT and claims are valid, protected data will be sent to client</a:t>
             </a:r>
           </a:p>
         </p:txBody>

</xml_diff>